<commit_message>
actualizando documentos que envio el profesor
</commit_message>
<xml_diff>
--- a/Diapositivas/2026 0 Tema 2 Elaboración del Plan de investigación Económica.pptx
+++ b/Diapositivas/2026 0 Tema 2 Elaboración del Plan de investigación Económica.pptx
@@ -15,6 +15,7 @@
     <p:sldId id="729" r:id="rId9"/>
     <p:sldId id="730" r:id="rId10"/>
     <p:sldId id="732" r:id="rId11"/>
+    <p:sldId id="733" r:id="rId12"/>
   </p:sldIdLst>
   <p:sldSz cx="12192000" cy="6858000"/>
   <p:notesSz cx="6858000" cy="9144000"/>
@@ -347,7 +348,7 @@
           <a:p>
             <a:fld id="{57FBF6DC-539E-4B2A-A21E-CEA4B38187F9}" type="datetimeFigureOut">
               <a:rPr lang="es-PE" smtClean="0"/>
-              <a:t>12/01/2026</a:t>
+              <a:t>13/01/2026</a:t>
             </a:fld>
             <a:endParaRPr lang="es-PE"/>
           </a:p>
@@ -555,7 +556,7 @@
           <a:p>
             <a:fld id="{57FBF6DC-539E-4B2A-A21E-CEA4B38187F9}" type="datetimeFigureOut">
               <a:rPr lang="es-PE" smtClean="0"/>
-              <a:t>12/01/2026</a:t>
+              <a:t>13/01/2026</a:t>
             </a:fld>
             <a:endParaRPr lang="es-PE"/>
           </a:p>
@@ -811,7 +812,7 @@
           <a:p>
             <a:fld id="{57FBF6DC-539E-4B2A-A21E-CEA4B38187F9}" type="datetimeFigureOut">
               <a:rPr lang="es-PE" smtClean="0"/>
-              <a:t>12/01/2026</a:t>
+              <a:t>13/01/2026</a:t>
             </a:fld>
             <a:endParaRPr lang="es-PE"/>
           </a:p>
@@ -985,7 +986,7 @@
           <a:p>
             <a:fld id="{57FBF6DC-539E-4B2A-A21E-CEA4B38187F9}" type="datetimeFigureOut">
               <a:rPr lang="es-PE" smtClean="0"/>
-              <a:t>12/01/2026</a:t>
+              <a:t>13/01/2026</a:t>
             </a:fld>
             <a:endParaRPr lang="es-PE"/>
           </a:p>
@@ -1328,7 +1329,7 @@
           <a:p>
             <a:fld id="{57FBF6DC-539E-4B2A-A21E-CEA4B38187F9}" type="datetimeFigureOut">
               <a:rPr lang="es-PE" smtClean="0"/>
-              <a:t>12/01/2026</a:t>
+              <a:t>13/01/2026</a:t>
             </a:fld>
             <a:endParaRPr lang="es-PE"/>
           </a:p>
@@ -1603,7 +1604,7 @@
           <a:p>
             <a:fld id="{57FBF6DC-539E-4B2A-A21E-CEA4B38187F9}" type="datetimeFigureOut">
               <a:rPr lang="es-PE" smtClean="0"/>
-              <a:t>12/01/2026</a:t>
+              <a:t>13/01/2026</a:t>
             </a:fld>
             <a:endParaRPr lang="es-PE"/>
           </a:p>
@@ -1982,7 +1983,7 @@
           <a:p>
             <a:fld id="{57FBF6DC-539E-4B2A-A21E-CEA4B38187F9}" type="datetimeFigureOut">
               <a:rPr lang="es-PE" smtClean="0"/>
-              <a:t>12/01/2026</a:t>
+              <a:t>13/01/2026</a:t>
             </a:fld>
             <a:endParaRPr lang="es-PE"/>
           </a:p>
@@ -2100,7 +2101,7 @@
           <a:p>
             <a:fld id="{57FBF6DC-539E-4B2A-A21E-CEA4B38187F9}" type="datetimeFigureOut">
               <a:rPr lang="es-PE" smtClean="0"/>
-              <a:t>12/01/2026</a:t>
+              <a:t>13/01/2026</a:t>
             </a:fld>
             <a:endParaRPr lang="es-PE"/>
           </a:p>
@@ -2271,7 +2272,7 @@
           <a:p>
             <a:fld id="{57FBF6DC-539E-4B2A-A21E-CEA4B38187F9}" type="datetimeFigureOut">
               <a:rPr lang="es-PE" smtClean="0"/>
-              <a:t>12/01/2026</a:t>
+              <a:t>13/01/2026</a:t>
             </a:fld>
             <a:endParaRPr lang="es-PE"/>
           </a:p>
@@ -2625,7 +2626,7 @@
           <a:p>
             <a:fld id="{57FBF6DC-539E-4B2A-A21E-CEA4B38187F9}" type="datetimeFigureOut">
               <a:rPr lang="es-PE" smtClean="0"/>
-              <a:t>12/01/2026</a:t>
+              <a:t>13/01/2026</a:t>
             </a:fld>
             <a:endParaRPr lang="es-PE"/>
           </a:p>
@@ -3007,7 +3008,7 @@
           <a:p>
             <a:fld id="{57FBF6DC-539E-4B2A-A21E-CEA4B38187F9}" type="datetimeFigureOut">
               <a:rPr lang="es-PE" smtClean="0"/>
-              <a:t>12/01/2026</a:t>
+              <a:t>13/01/2026</a:t>
             </a:fld>
             <a:endParaRPr lang="es-PE"/>
           </a:p>
@@ -3294,7 +3295,7 @@
           <a:p>
             <a:fld id="{57FBF6DC-539E-4B2A-A21E-CEA4B38187F9}" type="datetimeFigureOut">
               <a:rPr lang="es-PE" smtClean="0"/>
-              <a:t>12/01/2026</a:t>
+              <a:t>13/01/2026</a:t>
             </a:fld>
             <a:endParaRPr lang="es-PE"/>
           </a:p>
@@ -4102,6 +4103,167 @@
 </p:sld>
 </file>
 
+<file path=ppt/slides/slide11.xml><?xml version="1.0" encoding="utf-8"?>
+<p:sld xmlns:a="http://schemas.openxmlformats.org/drawingml/2006/main" xmlns:r="http://schemas.openxmlformats.org/officeDocument/2006/relationships" xmlns:p="http://schemas.openxmlformats.org/presentationml/2006/main">
+  <p:cSld>
+    <p:spTree>
+      <p:nvGrpSpPr>
+        <p:cNvPr id="1" name=""/>
+        <p:cNvGrpSpPr/>
+        <p:nvPr/>
+      </p:nvGrpSpPr>
+      <p:grpSpPr>
+        <a:xfrm>
+          <a:off x="0" y="0"/>
+          <a:ext cx="0" cy="0"/>
+          <a:chOff x="0" y="0"/>
+          <a:chExt cx="0" cy="0"/>
+        </a:xfrm>
+      </p:grpSpPr>
+      <p:sp>
+        <p:nvSpPr>
+          <p:cNvPr id="2" name="CuadroTexto 1"/>
+          <p:cNvSpPr txBox="1"/>
+          <p:nvPr/>
+        </p:nvSpPr>
+        <p:spPr>
+          <a:xfrm>
+            <a:off x="540327" y="440575"/>
+            <a:ext cx="11014364" cy="3970318"/>
+          </a:xfrm>
+          <a:prstGeom prst="rect">
+            <a:avLst/>
+          </a:prstGeom>
+          <a:noFill/>
+        </p:spPr>
+        <p:txBody>
+          <a:bodyPr wrap="square" rtlCol="0">
+            <a:spAutoFit/>
+          </a:bodyPr>
+          <a:lstStyle/>
+          <a:p>
+            <a:r>
+              <a:rPr lang="es-MX" dirty="0" err="1" smtClean="0"/>
+              <a:t>Justificacion</a:t>
+            </a:r>
+            <a:r>
+              <a:rPr lang="es-MX" dirty="0" smtClean="0"/>
+              <a:t>: la importancia del tema de investigación.</a:t>
+            </a:r>
+          </a:p>
+          <a:p>
+            <a:r>
+              <a:rPr lang="es-MX" dirty="0" smtClean="0"/>
+              <a:t>Teoría </a:t>
+            </a:r>
+          </a:p>
+          <a:p>
+            <a:r>
+              <a:rPr lang="es-MX" dirty="0" smtClean="0"/>
+              <a:t>Práctica </a:t>
+            </a:r>
+          </a:p>
+          <a:p>
+            <a:r>
+              <a:rPr lang="es-MX" dirty="0" err="1" smtClean="0"/>
+              <a:t>Metodologica</a:t>
+            </a:r>
+            <a:endParaRPr lang="es-MX" dirty="0" smtClean="0"/>
+          </a:p>
+          <a:p>
+            <a:r>
+              <a:rPr lang="es-MX" dirty="0" smtClean="0"/>
+              <a:t>Problema de la Investigación. </a:t>
+            </a:r>
+          </a:p>
+          <a:p>
+            <a:r>
+              <a:rPr lang="es-MX" dirty="0"/>
+              <a:t>	</a:t>
+            </a:r>
+            <a:r>
+              <a:rPr lang="es-MX" dirty="0" smtClean="0"/>
+              <a:t>problema principal. </a:t>
+            </a:r>
+          </a:p>
+          <a:p>
+            <a:r>
+              <a:rPr lang="es-MX" dirty="0"/>
+              <a:t>	</a:t>
+            </a:r>
+            <a:r>
+              <a:rPr lang="es-MX" b="1" dirty="0" smtClean="0"/>
+              <a:t>¿Cuáles son los factores , de formalidad empresarial y de la percepción Institucional determinan la 	victimización por extorsión  en las microempresas de Huaycán ?</a:t>
+            </a:r>
+          </a:p>
+          <a:p>
+            <a:r>
+              <a:rPr lang="es-MX" dirty="0"/>
+              <a:t>	</a:t>
+            </a:r>
+            <a:r>
+              <a:rPr lang="es-MX" dirty="0" smtClean="0"/>
+              <a:t>problemas específicos entres 1-3 problemas específicos el profesor sugiere 2</a:t>
+            </a:r>
+          </a:p>
+          <a:p>
+            <a:r>
+              <a:rPr lang="es-MX" dirty="0" smtClean="0"/>
+              <a:t>	¿Cómo se relaciona la condición de formalidad de la microempresa </a:t>
+            </a:r>
+          </a:p>
+          <a:p>
+            <a:r>
+              <a:rPr lang="es-MX" dirty="0" smtClean="0"/>
+              <a:t>Objetivos de la investigación</a:t>
+            </a:r>
+          </a:p>
+          <a:p>
+            <a:r>
+              <a:rPr lang="es-MX" dirty="0"/>
+              <a:t>	</a:t>
+            </a:r>
+            <a:r>
+              <a:rPr lang="es-MX" dirty="0" smtClean="0"/>
+              <a:t>objetivo principal</a:t>
+            </a:r>
+          </a:p>
+          <a:p>
+            <a:r>
+              <a:rPr lang="es-MX" dirty="0"/>
+              <a:t>	</a:t>
+            </a:r>
+            <a:r>
+              <a:rPr lang="es-MX" dirty="0" smtClean="0"/>
+              <a:t>objetivos específicos (pasos o acciones que se espera hacer para dar un a respuesta a los problemas)</a:t>
+            </a:r>
+          </a:p>
+          <a:p>
+            <a:r>
+              <a:rPr lang="es-MX" dirty="0"/>
+              <a:t>	</a:t>
+            </a:r>
+            <a:r>
+              <a:rPr lang="es-MX" dirty="0" smtClean="0"/>
+              <a:t>	se suele comenzar con determinar, conocer , identificar.</a:t>
+            </a:r>
+            <a:endParaRPr lang="es-MX" dirty="0"/>
+          </a:p>
+        </p:txBody>
+      </p:sp>
+    </p:spTree>
+    <p:extLst>
+      <p:ext uri="{BB962C8B-B14F-4D97-AF65-F5344CB8AC3E}">
+        <p14:creationId xmlns:p14="http://schemas.microsoft.com/office/powerpoint/2010/main" val="3387919877"/>
+      </p:ext>
+    </p:extLst>
+  </p:cSld>
+  <p:clrMapOvr>
+    <a:masterClrMapping/>
+  </p:clrMapOvr>
+</p:sld>
+</file>
+
 <file path=ppt/slides/slide2.xml><?xml version="1.0" encoding="utf-8"?>
 <p:sld xmlns:a="http://schemas.openxmlformats.org/drawingml/2006/main" xmlns:r="http://schemas.openxmlformats.org/officeDocument/2006/relationships" xmlns:p="http://schemas.openxmlformats.org/presentationml/2006/main">
   <p:cSld>

</xml_diff>

<commit_message>
apuntes de comentarios de clase
</commit_message>
<xml_diff>
--- a/Diapositivas/2026 0 Tema 2 Elaboración del Plan de investigación Económica.pptx
+++ b/Diapositivas/2026 0 Tema 2 Elaboración del Plan de investigación Económica.pptx
@@ -348,7 +348,7 @@
           <a:p>
             <a:fld id="{57FBF6DC-539E-4B2A-A21E-CEA4B38187F9}" type="datetimeFigureOut">
               <a:rPr lang="es-PE" smtClean="0"/>
-              <a:t>13/01/2026</a:t>
+              <a:t>19/01/2026</a:t>
             </a:fld>
             <a:endParaRPr lang="es-PE"/>
           </a:p>
@@ -556,7 +556,7 @@
           <a:p>
             <a:fld id="{57FBF6DC-539E-4B2A-A21E-CEA4B38187F9}" type="datetimeFigureOut">
               <a:rPr lang="es-PE" smtClean="0"/>
-              <a:t>13/01/2026</a:t>
+              <a:t>19/01/2026</a:t>
             </a:fld>
             <a:endParaRPr lang="es-PE"/>
           </a:p>
@@ -812,7 +812,7 @@
           <a:p>
             <a:fld id="{57FBF6DC-539E-4B2A-A21E-CEA4B38187F9}" type="datetimeFigureOut">
               <a:rPr lang="es-PE" smtClean="0"/>
-              <a:t>13/01/2026</a:t>
+              <a:t>19/01/2026</a:t>
             </a:fld>
             <a:endParaRPr lang="es-PE"/>
           </a:p>
@@ -986,7 +986,7 @@
           <a:p>
             <a:fld id="{57FBF6DC-539E-4B2A-A21E-CEA4B38187F9}" type="datetimeFigureOut">
               <a:rPr lang="es-PE" smtClean="0"/>
-              <a:t>13/01/2026</a:t>
+              <a:t>19/01/2026</a:t>
             </a:fld>
             <a:endParaRPr lang="es-PE"/>
           </a:p>
@@ -1329,7 +1329,7 @@
           <a:p>
             <a:fld id="{57FBF6DC-539E-4B2A-A21E-CEA4B38187F9}" type="datetimeFigureOut">
               <a:rPr lang="es-PE" smtClean="0"/>
-              <a:t>13/01/2026</a:t>
+              <a:t>19/01/2026</a:t>
             </a:fld>
             <a:endParaRPr lang="es-PE"/>
           </a:p>
@@ -1604,7 +1604,7 @@
           <a:p>
             <a:fld id="{57FBF6DC-539E-4B2A-A21E-CEA4B38187F9}" type="datetimeFigureOut">
               <a:rPr lang="es-PE" smtClean="0"/>
-              <a:t>13/01/2026</a:t>
+              <a:t>19/01/2026</a:t>
             </a:fld>
             <a:endParaRPr lang="es-PE"/>
           </a:p>
@@ -1983,7 +1983,7 @@
           <a:p>
             <a:fld id="{57FBF6DC-539E-4B2A-A21E-CEA4B38187F9}" type="datetimeFigureOut">
               <a:rPr lang="es-PE" smtClean="0"/>
-              <a:t>13/01/2026</a:t>
+              <a:t>19/01/2026</a:t>
             </a:fld>
             <a:endParaRPr lang="es-PE"/>
           </a:p>
@@ -2101,7 +2101,7 @@
           <a:p>
             <a:fld id="{57FBF6DC-539E-4B2A-A21E-CEA4B38187F9}" type="datetimeFigureOut">
               <a:rPr lang="es-PE" smtClean="0"/>
-              <a:t>13/01/2026</a:t>
+              <a:t>19/01/2026</a:t>
             </a:fld>
             <a:endParaRPr lang="es-PE"/>
           </a:p>
@@ -2272,7 +2272,7 @@
           <a:p>
             <a:fld id="{57FBF6DC-539E-4B2A-A21E-CEA4B38187F9}" type="datetimeFigureOut">
               <a:rPr lang="es-PE" smtClean="0"/>
-              <a:t>13/01/2026</a:t>
+              <a:t>19/01/2026</a:t>
             </a:fld>
             <a:endParaRPr lang="es-PE"/>
           </a:p>
@@ -2626,7 +2626,7 @@
           <a:p>
             <a:fld id="{57FBF6DC-539E-4B2A-A21E-CEA4B38187F9}" type="datetimeFigureOut">
               <a:rPr lang="es-PE" smtClean="0"/>
-              <a:t>13/01/2026</a:t>
+              <a:t>19/01/2026</a:t>
             </a:fld>
             <a:endParaRPr lang="es-PE"/>
           </a:p>
@@ -3008,7 +3008,7 @@
           <a:p>
             <a:fld id="{57FBF6DC-539E-4B2A-A21E-CEA4B38187F9}" type="datetimeFigureOut">
               <a:rPr lang="es-PE" smtClean="0"/>
-              <a:t>13/01/2026</a:t>
+              <a:t>19/01/2026</a:t>
             </a:fld>
             <a:endParaRPr lang="es-PE"/>
           </a:p>
@@ -3295,7 +3295,7 @@
           <a:p>
             <a:fld id="{57FBF6DC-539E-4B2A-A21E-CEA4B38187F9}" type="datetimeFigureOut">
               <a:rPr lang="es-PE" smtClean="0"/>
-              <a:t>13/01/2026</a:t>
+              <a:t>19/01/2026</a:t>
             </a:fld>
             <a:endParaRPr lang="es-PE"/>
           </a:p>

</xml_diff>